<commit_message>
mvc video presentration v1.2
</commit_message>
<xml_diff>
--- a/MVC_video.pptx
+++ b/MVC_video.pptx
@@ -5,11 +5,12 @@
     <p:sldMasterId id="2147483737" r:id="rId1"/>
   </p:sldMasterIdLst>
   <p:sldIdLst>
-    <p:sldId id="256" r:id="rId2"/>
-    <p:sldId id="257" r:id="rId3"/>
+    <p:sldId id="261" r:id="rId2"/>
+    <p:sldId id="256" r:id="rId3"/>
     <p:sldId id="258" r:id="rId4"/>
     <p:sldId id="259" r:id="rId5"/>
     <p:sldId id="260" r:id="rId6"/>
+    <p:sldId id="257" r:id="rId7"/>
   </p:sldIdLst>
   <p:sldSz cx="12192000" cy="6858000"/>
   <p:notesSz cx="6858000" cy="9144000"/>
@@ -182,7 +183,7 @@
           <a:noFill/>
           <a:extLst>
             <a:ext uri="{909E8E84-426E-40dd-AFC4-6F175D3DCCD1}">
-              <a14:hiddenFill xmlns:a14="http://schemas.microsoft.com/office/drawing/2010/main" xmlns="">
+              <a14:hiddenFill xmlns="" xmlns:a14="http://schemas.microsoft.com/office/drawing/2010/main">
                 <a:solidFill>
                   <a:srgbClr val="FFFFFF"/>
                 </a:solidFill>
@@ -242,7 +243,7 @@
             </a:ln>
             <a:extLst>
               <a:ext uri="{91240B29-F687-4f45-9708-019B960494DF}">
-                <a14:hiddenLine xmlns:a14="http://schemas.microsoft.com/office/drawing/2010/main" xmlns="" w="9525">
+                <a14:hiddenLine xmlns="" xmlns:a14="http://schemas.microsoft.com/office/drawing/2010/main" w="9525">
                   <a:solidFill>
                     <a:srgbClr val="000000"/>
                   </a:solidFill>
@@ -332,7 +333,7 @@
             </a:ln>
             <a:extLst>
               <a:ext uri="{91240B29-F687-4f45-9708-019B960494DF}">
-                <a14:hiddenLine xmlns:a14="http://schemas.microsoft.com/office/drawing/2010/main" xmlns="" w="9525">
+                <a14:hiddenLine xmlns="" xmlns:a14="http://schemas.microsoft.com/office/drawing/2010/main" w="9525">
                   <a:solidFill>
                     <a:srgbClr val="000000"/>
                   </a:solidFill>
@@ -422,7 +423,7 @@
             </a:ln>
             <a:extLst>
               <a:ext uri="{91240B29-F687-4f45-9708-019B960494DF}">
-                <a14:hiddenLine xmlns:a14="http://schemas.microsoft.com/office/drawing/2010/main" xmlns="" w="9525">
+                <a14:hiddenLine xmlns="" xmlns:a14="http://schemas.microsoft.com/office/drawing/2010/main" w="9525">
                   <a:solidFill>
                     <a:srgbClr val="000000"/>
                   </a:solidFill>
@@ -456,7 +457,7 @@
             </a:ln>
             <a:extLst>
               <a:ext uri="{91240B29-F687-4f45-9708-019B960494DF}">
-                <a14:hiddenLine xmlns:a14="http://schemas.microsoft.com/office/drawing/2010/main" xmlns="" w="9525">
+                <a14:hiddenLine xmlns="" xmlns:a14="http://schemas.microsoft.com/office/drawing/2010/main" w="9525">
                   <a:solidFill>
                     <a:srgbClr val="000000"/>
                   </a:solidFill>
@@ -546,7 +547,7 @@
             </a:ln>
             <a:extLst>
               <a:ext uri="{91240B29-F687-4f45-9708-019B960494DF}">
-                <a14:hiddenLine xmlns:a14="http://schemas.microsoft.com/office/drawing/2010/main" xmlns="" w="9525">
+                <a14:hiddenLine xmlns="" xmlns:a14="http://schemas.microsoft.com/office/drawing/2010/main" w="9525">
                   <a:solidFill>
                     <a:srgbClr val="000000"/>
                   </a:solidFill>
@@ -608,7 +609,7 @@
             </a:ln>
             <a:extLst>
               <a:ext uri="{91240B29-F687-4f45-9708-019B960494DF}">
-                <a14:hiddenLine xmlns:a14="http://schemas.microsoft.com/office/drawing/2010/main" xmlns="" w="9525">
+                <a14:hiddenLine xmlns="" xmlns:a14="http://schemas.microsoft.com/office/drawing/2010/main" w="9525">
                   <a:solidFill>
                     <a:srgbClr val="000000"/>
                   </a:solidFill>
@@ -670,7 +671,7 @@
             </a:ln>
             <a:extLst>
               <a:ext uri="{91240B29-F687-4f45-9708-019B960494DF}">
-                <a14:hiddenLine xmlns:a14="http://schemas.microsoft.com/office/drawing/2010/main" xmlns="" w="9525">
+                <a14:hiddenLine xmlns="" xmlns:a14="http://schemas.microsoft.com/office/drawing/2010/main" w="9525">
                   <a:solidFill>
                     <a:srgbClr val="000000"/>
                   </a:solidFill>
@@ -760,7 +761,7 @@
             </a:ln>
             <a:extLst>
               <a:ext uri="{91240B29-F687-4f45-9708-019B960494DF}">
-                <a14:hiddenLine xmlns:a14="http://schemas.microsoft.com/office/drawing/2010/main" xmlns="" w="9525">
+                <a14:hiddenLine xmlns="" xmlns:a14="http://schemas.microsoft.com/office/drawing/2010/main" w="9525">
                   <a:solidFill>
                     <a:srgbClr val="000000"/>
                   </a:solidFill>
@@ -822,7 +823,7 @@
             </a:ln>
             <a:extLst>
               <a:ext uri="{91240B29-F687-4f45-9708-019B960494DF}">
-                <a14:hiddenLine xmlns:a14="http://schemas.microsoft.com/office/drawing/2010/main" xmlns="" w="9525">
+                <a14:hiddenLine xmlns="" xmlns:a14="http://schemas.microsoft.com/office/drawing/2010/main" w="9525">
                   <a:solidFill>
                     <a:srgbClr val="000000"/>
                   </a:solidFill>
@@ -884,7 +885,7 @@
             </a:ln>
             <a:extLst>
               <a:ext uri="{91240B29-F687-4f45-9708-019B960494DF}">
-                <a14:hiddenLine xmlns:a14="http://schemas.microsoft.com/office/drawing/2010/main" xmlns="" w="9525">
+                <a14:hiddenLine xmlns="" xmlns:a14="http://schemas.microsoft.com/office/drawing/2010/main" w="9525">
                   <a:solidFill>
                     <a:srgbClr val="000000"/>
                   </a:solidFill>
@@ -974,7 +975,7 @@
             </a:ln>
             <a:extLst>
               <a:ext uri="{91240B29-F687-4f45-9708-019B960494DF}">
-                <a14:hiddenLine xmlns:a14="http://schemas.microsoft.com/office/drawing/2010/main" xmlns="" w="9525">
+                <a14:hiddenLine xmlns="" xmlns:a14="http://schemas.microsoft.com/office/drawing/2010/main" w="9525">
                   <a:solidFill>
                     <a:srgbClr val="000000"/>
                   </a:solidFill>
@@ -1064,7 +1065,7 @@
             </a:ln>
             <a:extLst>
               <a:ext uri="{91240B29-F687-4f45-9708-019B960494DF}">
-                <a14:hiddenLine xmlns:a14="http://schemas.microsoft.com/office/drawing/2010/main" xmlns="" w="9525">
+                <a14:hiddenLine xmlns="" xmlns:a14="http://schemas.microsoft.com/office/drawing/2010/main" w="9525">
                   <a:solidFill>
                     <a:srgbClr val="000000"/>
                   </a:solidFill>
@@ -1126,7 +1127,7 @@
             </a:ln>
             <a:extLst>
               <a:ext uri="{91240B29-F687-4f45-9708-019B960494DF}">
-                <a14:hiddenLine xmlns:a14="http://schemas.microsoft.com/office/drawing/2010/main" xmlns="" w="9525">
+                <a14:hiddenLine xmlns="" xmlns:a14="http://schemas.microsoft.com/office/drawing/2010/main" w="9525">
                   <a:solidFill>
                     <a:srgbClr val="000000"/>
                   </a:solidFill>
@@ -1236,7 +1237,7 @@
             </a:ln>
             <a:extLst>
               <a:ext uri="{91240B29-F687-4f45-9708-019B960494DF}">
-                <a14:hiddenLine xmlns:a14="http://schemas.microsoft.com/office/drawing/2010/main" xmlns="" w="9525">
+                <a14:hiddenLine xmlns="" xmlns:a14="http://schemas.microsoft.com/office/drawing/2010/main" w="9525">
                   <a:solidFill>
                     <a:srgbClr val="000000"/>
                   </a:solidFill>
@@ -1298,7 +1299,7 @@
             </a:ln>
             <a:extLst>
               <a:ext uri="{91240B29-F687-4f45-9708-019B960494DF}">
-                <a14:hiddenLine xmlns:a14="http://schemas.microsoft.com/office/drawing/2010/main" xmlns="" w="9525">
+                <a14:hiddenLine xmlns="" xmlns:a14="http://schemas.microsoft.com/office/drawing/2010/main" w="9525">
                   <a:solidFill>
                     <a:srgbClr val="000000"/>
                   </a:solidFill>
@@ -1388,7 +1389,7 @@
             </a:ln>
             <a:extLst>
               <a:ext uri="{91240B29-F687-4f45-9708-019B960494DF}">
-                <a14:hiddenLine xmlns:a14="http://schemas.microsoft.com/office/drawing/2010/main" xmlns="" w="9525">
+                <a14:hiddenLine xmlns="" xmlns:a14="http://schemas.microsoft.com/office/drawing/2010/main" w="9525">
                   <a:solidFill>
                     <a:srgbClr val="000000"/>
                   </a:solidFill>
@@ -1478,7 +1479,7 @@
             </a:ln>
             <a:extLst>
               <a:ext uri="{91240B29-F687-4f45-9708-019B960494DF}">
-                <a14:hiddenLine xmlns:a14="http://schemas.microsoft.com/office/drawing/2010/main" xmlns="" w="9525">
+                <a14:hiddenLine xmlns="" xmlns:a14="http://schemas.microsoft.com/office/drawing/2010/main" w="9525">
                   <a:solidFill>
                     <a:srgbClr val="000000"/>
                   </a:solidFill>
@@ -1540,7 +1541,7 @@
             </a:ln>
             <a:extLst>
               <a:ext uri="{91240B29-F687-4f45-9708-019B960494DF}">
-                <a14:hiddenLine xmlns:a14="http://schemas.microsoft.com/office/drawing/2010/main" xmlns="" w="9525">
+                <a14:hiddenLine xmlns="" xmlns:a14="http://schemas.microsoft.com/office/drawing/2010/main" w="9525">
                   <a:solidFill>
                     <a:srgbClr val="000000"/>
                   </a:solidFill>
@@ -1630,7 +1631,7 @@
             </a:ln>
             <a:extLst>
               <a:ext uri="{91240B29-F687-4f45-9708-019B960494DF}">
-                <a14:hiddenLine xmlns:a14="http://schemas.microsoft.com/office/drawing/2010/main" xmlns="" w="9525">
+                <a14:hiddenLine xmlns="" xmlns:a14="http://schemas.microsoft.com/office/drawing/2010/main" w="9525">
                   <a:solidFill>
                     <a:srgbClr val="000000"/>
                   </a:solidFill>
@@ -1720,7 +1721,7 @@
             </a:ln>
             <a:extLst>
               <a:ext uri="{91240B29-F687-4f45-9708-019B960494DF}">
-                <a14:hiddenLine xmlns:a14="http://schemas.microsoft.com/office/drawing/2010/main" xmlns="" w="9525">
+                <a14:hiddenLine xmlns="" xmlns:a14="http://schemas.microsoft.com/office/drawing/2010/main" w="9525">
                   <a:solidFill>
                     <a:srgbClr val="000000"/>
                   </a:solidFill>
@@ -1776,7 +1777,7 @@
             </a:ln>
             <a:extLst>
               <a:ext uri="{91240B29-F687-4f45-9708-019B960494DF}">
-                <a14:hiddenLine xmlns:a14="http://schemas.microsoft.com/office/drawing/2010/main" xmlns="" w="9525">
+                <a14:hiddenLine xmlns="" xmlns:a14="http://schemas.microsoft.com/office/drawing/2010/main" w="9525">
                   <a:solidFill>
                     <a:srgbClr val="000000"/>
                   </a:solidFill>
@@ -1866,7 +1867,7 @@
             </a:ln>
             <a:extLst>
               <a:ext uri="{91240B29-F687-4f45-9708-019B960494DF}">
-                <a14:hiddenLine xmlns:a14="http://schemas.microsoft.com/office/drawing/2010/main" xmlns="" w="9525">
+                <a14:hiddenLine xmlns="" xmlns:a14="http://schemas.microsoft.com/office/drawing/2010/main" w="9525">
                   <a:solidFill>
                     <a:srgbClr val="000000"/>
                   </a:solidFill>
@@ -1922,7 +1923,7 @@
             </a:ln>
             <a:extLst>
               <a:ext uri="{91240B29-F687-4f45-9708-019B960494DF}">
-                <a14:hiddenLine xmlns:a14="http://schemas.microsoft.com/office/drawing/2010/main" xmlns="" w="9525">
+                <a14:hiddenLine xmlns="" xmlns:a14="http://schemas.microsoft.com/office/drawing/2010/main" w="9525">
                   <a:solidFill>
                     <a:srgbClr val="000000"/>
                   </a:solidFill>
@@ -2012,7 +2013,7 @@
             </a:ln>
             <a:extLst>
               <a:ext uri="{91240B29-F687-4f45-9708-019B960494DF}">
-                <a14:hiddenLine xmlns:a14="http://schemas.microsoft.com/office/drawing/2010/main" xmlns="" w="9525">
+                <a14:hiddenLine xmlns="" xmlns:a14="http://schemas.microsoft.com/office/drawing/2010/main" w="9525">
                   <a:solidFill>
                     <a:srgbClr val="000000"/>
                   </a:solidFill>
@@ -2080,7 +2081,7 @@
             </a:ln>
             <a:extLst>
               <a:ext uri="{91240B29-F687-4f45-9708-019B960494DF}">
-                <a14:hiddenLine xmlns:a14="http://schemas.microsoft.com/office/drawing/2010/main" xmlns="" w="9525">
+                <a14:hiddenLine xmlns="" xmlns:a14="http://schemas.microsoft.com/office/drawing/2010/main" w="9525">
                   <a:solidFill>
                     <a:srgbClr val="000000"/>
                   </a:solidFill>
@@ -2170,7 +2171,7 @@
             </a:ln>
             <a:extLst>
               <a:ext uri="{91240B29-F687-4f45-9708-019B960494DF}">
-                <a14:hiddenLine xmlns:a14="http://schemas.microsoft.com/office/drawing/2010/main" xmlns="" w="9525">
+                <a14:hiddenLine xmlns="" xmlns:a14="http://schemas.microsoft.com/office/drawing/2010/main" w="9525">
                   <a:solidFill>
                     <a:srgbClr val="000000"/>
                   </a:solidFill>
@@ -2238,7 +2239,7 @@
             </a:ln>
             <a:extLst>
               <a:ext uri="{91240B29-F687-4f45-9708-019B960494DF}">
-                <a14:hiddenLine xmlns:a14="http://schemas.microsoft.com/office/drawing/2010/main" xmlns="" w="9525">
+                <a14:hiddenLine xmlns="" xmlns:a14="http://schemas.microsoft.com/office/drawing/2010/main" w="9525">
                   <a:solidFill>
                     <a:srgbClr val="000000"/>
                   </a:solidFill>
@@ -2328,7 +2329,7 @@
             </a:ln>
             <a:extLst>
               <a:ext uri="{91240B29-F687-4f45-9708-019B960494DF}">
-                <a14:hiddenLine xmlns:a14="http://schemas.microsoft.com/office/drawing/2010/main" xmlns="" w="9525">
+                <a14:hiddenLine xmlns="" xmlns:a14="http://schemas.microsoft.com/office/drawing/2010/main" w="9525">
                   <a:solidFill>
                     <a:srgbClr val="000000"/>
                   </a:solidFill>
@@ -2362,7 +2363,7 @@
             </a:ln>
             <a:extLst>
               <a:ext uri="{91240B29-F687-4f45-9708-019B960494DF}">
-                <a14:hiddenLine xmlns:a14="http://schemas.microsoft.com/office/drawing/2010/main" xmlns="" w="9525">
+                <a14:hiddenLine xmlns="" xmlns:a14="http://schemas.microsoft.com/office/drawing/2010/main" w="9525">
                   <a:solidFill>
                     <a:srgbClr val="000000"/>
                   </a:solidFill>
@@ -2452,7 +2453,7 @@
             </a:ln>
             <a:extLst>
               <a:ext uri="{91240B29-F687-4f45-9708-019B960494DF}">
-                <a14:hiddenLine xmlns:a14="http://schemas.microsoft.com/office/drawing/2010/main" xmlns="" w="9525">
+                <a14:hiddenLine xmlns="" xmlns:a14="http://schemas.microsoft.com/office/drawing/2010/main" w="9525">
                   <a:solidFill>
                     <a:srgbClr val="000000"/>
                   </a:solidFill>
@@ -2514,7 +2515,7 @@
             </a:ln>
             <a:extLst>
               <a:ext uri="{91240B29-F687-4f45-9708-019B960494DF}">
-                <a14:hiddenLine xmlns:a14="http://schemas.microsoft.com/office/drawing/2010/main" xmlns="" w="9525">
+                <a14:hiddenLine xmlns="" xmlns:a14="http://schemas.microsoft.com/office/drawing/2010/main" w="9525">
                   <a:solidFill>
                     <a:srgbClr val="000000"/>
                   </a:solidFill>
@@ -2576,7 +2577,7 @@
             </a:ln>
             <a:extLst>
               <a:ext uri="{91240B29-F687-4f45-9708-019B960494DF}">
-                <a14:hiddenLine xmlns:a14="http://schemas.microsoft.com/office/drawing/2010/main" xmlns="" w="9525">
+                <a14:hiddenLine xmlns="" xmlns:a14="http://schemas.microsoft.com/office/drawing/2010/main" w="9525">
                   <a:solidFill>
                     <a:srgbClr val="000000"/>
                   </a:solidFill>
@@ -2666,7 +2667,7 @@
             </a:ln>
             <a:extLst>
               <a:ext uri="{91240B29-F687-4f45-9708-019B960494DF}">
-                <a14:hiddenLine xmlns:a14="http://schemas.microsoft.com/office/drawing/2010/main" xmlns="" w="9525">
+                <a14:hiddenLine xmlns="" xmlns:a14="http://schemas.microsoft.com/office/drawing/2010/main" w="9525">
                   <a:solidFill>
                     <a:srgbClr val="000000"/>
                   </a:solidFill>
@@ -2734,7 +2735,7 @@
             </a:ln>
             <a:extLst>
               <a:ext uri="{91240B29-F687-4f45-9708-019B960494DF}">
-                <a14:hiddenLine xmlns:a14="http://schemas.microsoft.com/office/drawing/2010/main" xmlns="" w="9525">
+                <a14:hiddenLine xmlns="" xmlns:a14="http://schemas.microsoft.com/office/drawing/2010/main" w="9525">
                   <a:solidFill>
                     <a:srgbClr val="000000"/>
                   </a:solidFill>
@@ -2796,7 +2797,7 @@
             </a:ln>
             <a:extLst>
               <a:ext uri="{91240B29-F687-4f45-9708-019B960494DF}">
-                <a14:hiddenLine xmlns:a14="http://schemas.microsoft.com/office/drawing/2010/main" xmlns="" w="9525">
+                <a14:hiddenLine xmlns="" xmlns:a14="http://schemas.microsoft.com/office/drawing/2010/main" w="9525">
                   <a:solidFill>
                     <a:srgbClr val="000000"/>
                   </a:solidFill>
@@ -2886,7 +2887,7 @@
             </a:ln>
             <a:extLst>
               <a:ext uri="{91240B29-F687-4f45-9708-019B960494DF}">
-                <a14:hiddenLine xmlns:a14="http://schemas.microsoft.com/office/drawing/2010/main" xmlns="" w="9525">
+                <a14:hiddenLine xmlns="" xmlns:a14="http://schemas.microsoft.com/office/drawing/2010/main" w="9525">
                   <a:solidFill>
                     <a:srgbClr val="000000"/>
                   </a:solidFill>
@@ -2948,7 +2949,7 @@
             </a:ln>
             <a:extLst>
               <a:ext uri="{91240B29-F687-4f45-9708-019B960494DF}">
-                <a14:hiddenLine xmlns:a14="http://schemas.microsoft.com/office/drawing/2010/main" xmlns="" w="9525">
+                <a14:hiddenLine xmlns="" xmlns:a14="http://schemas.microsoft.com/office/drawing/2010/main" w="9525">
                   <a:solidFill>
                     <a:srgbClr val="000000"/>
                   </a:solidFill>
@@ -3038,7 +3039,7 @@
             </a:ln>
             <a:extLst>
               <a:ext uri="{91240B29-F687-4f45-9708-019B960494DF}">
-                <a14:hiddenLine xmlns:a14="http://schemas.microsoft.com/office/drawing/2010/main" xmlns="" w="9525">
+                <a14:hiddenLine xmlns="" xmlns:a14="http://schemas.microsoft.com/office/drawing/2010/main" w="9525">
                   <a:solidFill>
                     <a:srgbClr val="000000"/>
                   </a:solidFill>
@@ -3100,7 +3101,7 @@
             </a:ln>
             <a:extLst>
               <a:ext uri="{91240B29-F687-4f45-9708-019B960494DF}">
-                <a14:hiddenLine xmlns:a14="http://schemas.microsoft.com/office/drawing/2010/main" xmlns="" w="9525">
+                <a14:hiddenLine xmlns="" xmlns:a14="http://schemas.microsoft.com/office/drawing/2010/main" w="9525">
                   <a:solidFill>
                     <a:srgbClr val="000000"/>
                   </a:solidFill>
@@ -3190,7 +3191,7 @@
             </a:ln>
             <a:extLst>
               <a:ext uri="{91240B29-F687-4f45-9708-019B960494DF}">
-                <a14:hiddenLine xmlns:a14="http://schemas.microsoft.com/office/drawing/2010/main" xmlns="" w="9525">
+                <a14:hiddenLine xmlns="" xmlns:a14="http://schemas.microsoft.com/office/drawing/2010/main" w="9525">
                   <a:solidFill>
                     <a:srgbClr val="000000"/>
                   </a:solidFill>
@@ -3224,7 +3225,7 @@
             </a:ln>
             <a:extLst>
               <a:ext uri="{91240B29-F687-4f45-9708-019B960494DF}">
-                <a14:hiddenLine xmlns:a14="http://schemas.microsoft.com/office/drawing/2010/main" xmlns="" w="9525">
+                <a14:hiddenLine xmlns="" xmlns:a14="http://schemas.microsoft.com/office/drawing/2010/main" w="9525">
                   <a:solidFill>
                     <a:srgbClr val="000000"/>
                   </a:solidFill>
@@ -3289,7 +3290,7 @@
             </a:ln>
             <a:extLst>
               <a:ext uri="{91240B29-F687-4f45-9708-019B960494DF}">
-                <a14:hiddenLine xmlns:a14="http://schemas.microsoft.com/office/drawing/2010/main" xmlns="" w="9525">
+                <a14:hiddenLine xmlns="" xmlns:a14="http://schemas.microsoft.com/office/drawing/2010/main" w="9525">
                   <a:solidFill>
                     <a:srgbClr val="000000"/>
                   </a:solidFill>
@@ -3379,7 +3380,7 @@
             </a:ln>
             <a:extLst>
               <a:ext uri="{91240B29-F687-4f45-9708-019B960494DF}">
-                <a14:hiddenLine xmlns:a14="http://schemas.microsoft.com/office/drawing/2010/main" xmlns="" w="9525">
+                <a14:hiddenLine xmlns="" xmlns:a14="http://schemas.microsoft.com/office/drawing/2010/main" w="9525">
                   <a:solidFill>
                     <a:srgbClr val="000000"/>
                   </a:solidFill>
@@ -3441,7 +3442,7 @@
             </a:ln>
             <a:extLst>
               <a:ext uri="{91240B29-F687-4f45-9708-019B960494DF}">
-                <a14:hiddenLine xmlns:a14="http://schemas.microsoft.com/office/drawing/2010/main" xmlns="" w="9525">
+                <a14:hiddenLine xmlns="" xmlns:a14="http://schemas.microsoft.com/office/drawing/2010/main" w="9525">
                   <a:solidFill>
                     <a:srgbClr val="000000"/>
                   </a:solidFill>
@@ -3531,7 +3532,7 @@
             </a:ln>
             <a:extLst>
               <a:ext uri="{91240B29-F687-4f45-9708-019B960494DF}">
-                <a14:hiddenLine xmlns:a14="http://schemas.microsoft.com/office/drawing/2010/main" xmlns="" w="9525">
+                <a14:hiddenLine xmlns="" xmlns:a14="http://schemas.microsoft.com/office/drawing/2010/main" w="9525">
                   <a:solidFill>
                     <a:srgbClr val="000000"/>
                   </a:solidFill>
@@ -3621,7 +3622,7 @@
             </a:ln>
             <a:extLst>
               <a:ext uri="{91240B29-F687-4f45-9708-019B960494DF}">
-                <a14:hiddenLine xmlns:a14="http://schemas.microsoft.com/office/drawing/2010/main" xmlns="" w="9525">
+                <a14:hiddenLine xmlns="" xmlns:a14="http://schemas.microsoft.com/office/drawing/2010/main" w="9525">
                   <a:solidFill>
                     <a:srgbClr val="000000"/>
                   </a:solidFill>
@@ -3686,7 +3687,7 @@
             </a:ln>
             <a:extLst>
               <a:ext uri="{91240B29-F687-4f45-9708-019B960494DF}">
-                <a14:hiddenLine xmlns:a14="http://schemas.microsoft.com/office/drawing/2010/main" xmlns="" w="9525">
+                <a14:hiddenLine xmlns="" xmlns:a14="http://schemas.microsoft.com/office/drawing/2010/main" w="9525">
                   <a:solidFill>
                     <a:srgbClr val="000000"/>
                   </a:solidFill>
@@ -3748,7 +3749,7 @@
             </a:ln>
             <a:extLst>
               <a:ext uri="{91240B29-F687-4f45-9708-019B960494DF}">
-                <a14:hiddenLine xmlns:a14="http://schemas.microsoft.com/office/drawing/2010/main" xmlns="" w="9525">
+                <a14:hiddenLine xmlns="" xmlns:a14="http://schemas.microsoft.com/office/drawing/2010/main" w="9525">
                   <a:solidFill>
                     <a:srgbClr val="000000"/>
                   </a:solidFill>
@@ -3838,7 +3839,7 @@
             </a:ln>
             <a:extLst>
               <a:ext uri="{91240B29-F687-4f45-9708-019B960494DF}">
-                <a14:hiddenLine xmlns:a14="http://schemas.microsoft.com/office/drawing/2010/main" xmlns="" w="9525">
+                <a14:hiddenLine xmlns="" xmlns:a14="http://schemas.microsoft.com/office/drawing/2010/main" w="9525">
                   <a:solidFill>
                     <a:srgbClr val="000000"/>
                   </a:solidFill>
@@ -3928,7 +3929,7 @@
             </a:ln>
             <a:extLst>
               <a:ext uri="{91240B29-F687-4f45-9708-019B960494DF}">
-                <a14:hiddenLine xmlns:a14="http://schemas.microsoft.com/office/drawing/2010/main" xmlns="" w="9525">
+                <a14:hiddenLine xmlns="" xmlns:a14="http://schemas.microsoft.com/office/drawing/2010/main" w="9525">
                   <a:solidFill>
                     <a:srgbClr val="000000"/>
                   </a:solidFill>
@@ -3990,7 +3991,7 @@
             </a:ln>
             <a:extLst>
               <a:ext uri="{91240B29-F687-4f45-9708-019B960494DF}">
-                <a14:hiddenLine xmlns:a14="http://schemas.microsoft.com/office/drawing/2010/main" xmlns="" w="9525">
+                <a14:hiddenLine xmlns="" xmlns:a14="http://schemas.microsoft.com/office/drawing/2010/main" w="9525">
                   <a:solidFill>
                     <a:srgbClr val="000000"/>
                   </a:solidFill>
@@ -4110,7 +4111,7 @@
             </a:ln>
             <a:extLst>
               <a:ext uri="{91240B29-F687-4f45-9708-019B960494DF}">
-                <a14:hiddenLine xmlns:a14="http://schemas.microsoft.com/office/drawing/2010/main" xmlns="" w="9525">
+                <a14:hiddenLine xmlns="" xmlns:a14="http://schemas.microsoft.com/office/drawing/2010/main" w="9525">
                   <a:solidFill>
                     <a:srgbClr val="000000"/>
                   </a:solidFill>
@@ -4178,7 +4179,7 @@
             </a:ln>
             <a:extLst>
               <a:ext uri="{91240B29-F687-4f45-9708-019B960494DF}">
-                <a14:hiddenLine xmlns:a14="http://schemas.microsoft.com/office/drawing/2010/main" xmlns="" w="9525">
+                <a14:hiddenLine xmlns="" xmlns:a14="http://schemas.microsoft.com/office/drawing/2010/main" w="9525">
                   <a:solidFill>
                     <a:srgbClr val="000000"/>
                   </a:solidFill>
@@ -4268,7 +4269,7 @@
             </a:ln>
             <a:extLst>
               <a:ext uri="{91240B29-F687-4f45-9708-019B960494DF}">
-                <a14:hiddenLine xmlns:a14="http://schemas.microsoft.com/office/drawing/2010/main" xmlns="" w="9525">
+                <a14:hiddenLine xmlns="" xmlns:a14="http://schemas.microsoft.com/office/drawing/2010/main" w="9525">
                   <a:solidFill>
                     <a:srgbClr val="000000"/>
                   </a:solidFill>
@@ -4408,7 +4409,7 @@
           <a:p>
             <a:fld id="{367C922C-BE67-41A2-B295-B77D3DE255F6}" type="datetimeFigureOut">
               <a:rPr lang="en-US" smtClean="0"/>
-              <a:t>7/19/2017</a:t>
+              <a:t>20-Jul-17</a:t>
             </a:fld>
             <a:endParaRPr lang="en-US"/>
           </a:p>
@@ -4675,7 +4676,7 @@
           <a:p>
             <a:fld id="{367C922C-BE67-41A2-B295-B77D3DE255F6}" type="datetimeFigureOut">
               <a:rPr lang="en-US" smtClean="0"/>
-              <a:t>7/19/2017</a:t>
+              <a:t>20-Jul-17</a:t>
             </a:fld>
             <a:endParaRPr lang="en-US"/>
           </a:p>
@@ -4871,7 +4872,7 @@
           <a:p>
             <a:fld id="{367C922C-BE67-41A2-B295-B77D3DE255F6}" type="datetimeFigureOut">
               <a:rPr lang="en-US" smtClean="0"/>
-              <a:t>7/19/2017</a:t>
+              <a:t>20-Jul-17</a:t>
             </a:fld>
             <a:endParaRPr lang="en-US"/>
           </a:p>
@@ -5134,7 +5135,7 @@
           <a:p>
             <a:fld id="{367C922C-BE67-41A2-B295-B77D3DE255F6}" type="datetimeFigureOut">
               <a:rPr lang="en-US" smtClean="0"/>
-              <a:t>7/19/2017</a:t>
+              <a:t>20-Jul-17</a:t>
             </a:fld>
             <a:endParaRPr lang="en-US"/>
           </a:p>
@@ -5568,7 +5569,7 @@
           <a:p>
             <a:fld id="{367C922C-BE67-41A2-B295-B77D3DE255F6}" type="datetimeFigureOut">
               <a:rPr lang="en-US" smtClean="0"/>
-              <a:t>7/19/2017</a:t>
+              <a:t>20-Jul-17</a:t>
             </a:fld>
             <a:endParaRPr lang="en-US"/>
           </a:p>
@@ -6114,7 +6115,7 @@
           <a:p>
             <a:fld id="{367C922C-BE67-41A2-B295-B77D3DE255F6}" type="datetimeFigureOut">
               <a:rPr lang="en-US" smtClean="0"/>
-              <a:t>7/19/2017</a:t>
+              <a:t>20-Jul-17</a:t>
             </a:fld>
             <a:endParaRPr lang="en-US"/>
           </a:p>
@@ -6834,7 +6835,7 @@
           <a:p>
             <a:fld id="{367C922C-BE67-41A2-B295-B77D3DE255F6}" type="datetimeFigureOut">
               <a:rPr lang="en-US" smtClean="0"/>
-              <a:t>7/19/2017</a:t>
+              <a:t>20-Jul-17</a:t>
             </a:fld>
             <a:endParaRPr lang="en-US"/>
           </a:p>
@@ -7004,7 +7005,7 @@
           <a:p>
             <a:fld id="{367C922C-BE67-41A2-B295-B77D3DE255F6}" type="datetimeFigureOut">
               <a:rPr lang="en-US" smtClean="0"/>
-              <a:t>7/19/2017</a:t>
+              <a:t>20-Jul-17</a:t>
             </a:fld>
             <a:endParaRPr lang="en-US"/>
           </a:p>
@@ -7184,7 +7185,7 @@
           <a:p>
             <a:fld id="{367C922C-BE67-41A2-B295-B77D3DE255F6}" type="datetimeFigureOut">
               <a:rPr lang="en-US" smtClean="0"/>
-              <a:t>7/19/2017</a:t>
+              <a:t>20-Jul-17</a:t>
             </a:fld>
             <a:endParaRPr lang="en-US"/>
           </a:p>
@@ -7354,7 +7355,7 @@
           <a:p>
             <a:fld id="{367C922C-BE67-41A2-B295-B77D3DE255F6}" type="datetimeFigureOut">
               <a:rPr lang="en-US" smtClean="0"/>
-              <a:t>7/19/2017</a:t>
+              <a:t>20-Jul-17</a:t>
             </a:fld>
             <a:endParaRPr lang="en-US"/>
           </a:p>
@@ -7604,7 +7605,7 @@
           <a:p>
             <a:fld id="{367C922C-BE67-41A2-B295-B77D3DE255F6}" type="datetimeFigureOut">
               <a:rPr lang="en-US" smtClean="0"/>
-              <a:t>7/19/2017</a:t>
+              <a:t>20-Jul-17</a:t>
             </a:fld>
             <a:endParaRPr lang="en-US"/>
           </a:p>
@@ -7836,7 +7837,7 @@
           <a:p>
             <a:fld id="{367C922C-BE67-41A2-B295-B77D3DE255F6}" type="datetimeFigureOut">
               <a:rPr lang="en-US" smtClean="0"/>
-              <a:t>7/19/2017</a:t>
+              <a:t>20-Jul-17</a:t>
             </a:fld>
             <a:endParaRPr lang="en-US"/>
           </a:p>
@@ -8222,7 +8223,7 @@
           <a:p>
             <a:fld id="{367C922C-BE67-41A2-B295-B77D3DE255F6}" type="datetimeFigureOut">
               <a:rPr lang="en-US" smtClean="0"/>
-              <a:t>7/19/2017</a:t>
+              <a:t>20-Jul-17</a:t>
             </a:fld>
             <a:endParaRPr lang="en-US"/>
           </a:p>
@@ -8345,7 +8346,7 @@
           <a:p>
             <a:fld id="{367C922C-BE67-41A2-B295-B77D3DE255F6}" type="datetimeFigureOut">
               <a:rPr lang="en-US" smtClean="0"/>
-              <a:t>7/19/2017</a:t>
+              <a:t>20-Jul-17</a:t>
             </a:fld>
             <a:endParaRPr lang="en-US"/>
           </a:p>
@@ -8440,7 +8441,7 @@
           <a:p>
             <a:fld id="{367C922C-BE67-41A2-B295-B77D3DE255F6}" type="datetimeFigureOut">
               <a:rPr lang="en-US" smtClean="0"/>
-              <a:t>7/19/2017</a:t>
+              <a:t>20-Jul-17</a:t>
             </a:fld>
             <a:endParaRPr lang="en-US"/>
           </a:p>
@@ -8689,7 +8690,7 @@
           <a:p>
             <a:fld id="{367C922C-BE67-41A2-B295-B77D3DE255F6}" type="datetimeFigureOut">
               <a:rPr lang="en-US" smtClean="0"/>
-              <a:t>7/19/2017</a:t>
+              <a:t>20-Jul-17</a:t>
             </a:fld>
             <a:endParaRPr lang="en-US"/>
           </a:p>
@@ -8974,7 +8975,7 @@
           <a:p>
             <a:fld id="{367C922C-BE67-41A2-B295-B77D3DE255F6}" type="datetimeFigureOut">
               <a:rPr lang="en-US" smtClean="0"/>
-              <a:t>7/19/2017</a:t>
+              <a:t>20-Jul-17</a:t>
             </a:fld>
             <a:endParaRPr lang="en-US"/>
           </a:p>
@@ -9090,7 +9091,7 @@
           <a:noFill/>
           <a:extLst>
             <a:ext uri="{909E8E84-426E-40dd-AFC4-6F175D3DCCD1}">
-              <a14:hiddenFill xmlns:a14="http://schemas.microsoft.com/office/drawing/2010/main" xmlns="">
+              <a14:hiddenFill xmlns="" xmlns:a14="http://schemas.microsoft.com/office/drawing/2010/main">
                 <a:solidFill>
                   <a:srgbClr val="FFFFFF"/>
                 </a:solidFill>
@@ -9164,7 +9165,7 @@
               </a:ln>
               <a:extLst>
                 <a:ext uri="{91240B29-F687-4f45-9708-019B960494DF}">
-                  <a14:hiddenLine xmlns:a14="http://schemas.microsoft.com/office/drawing/2010/main" xmlns="" w="9525">
+                  <a14:hiddenLine xmlns="" xmlns:a14="http://schemas.microsoft.com/office/drawing/2010/main" w="9525">
                     <a:solidFill>
                       <a:srgbClr val="000000"/>
                     </a:solidFill>
@@ -9254,7 +9255,7 @@
               </a:ln>
               <a:extLst>
                 <a:ext uri="{91240B29-F687-4f45-9708-019B960494DF}">
-                  <a14:hiddenLine xmlns:a14="http://schemas.microsoft.com/office/drawing/2010/main" xmlns="" w="9525">
+                  <a14:hiddenLine xmlns="" xmlns:a14="http://schemas.microsoft.com/office/drawing/2010/main" w="9525">
                     <a:solidFill>
                       <a:srgbClr val="000000"/>
                     </a:solidFill>
@@ -9344,7 +9345,7 @@
               </a:ln>
               <a:extLst>
                 <a:ext uri="{91240B29-F687-4f45-9708-019B960494DF}">
-                  <a14:hiddenLine xmlns:a14="http://schemas.microsoft.com/office/drawing/2010/main" xmlns="" w="9525">
+                  <a14:hiddenLine xmlns="" xmlns:a14="http://schemas.microsoft.com/office/drawing/2010/main" w="9525">
                     <a:solidFill>
                       <a:srgbClr val="000000"/>
                     </a:solidFill>
@@ -9406,7 +9407,7 @@
               </a:ln>
               <a:extLst>
                 <a:ext uri="{91240B29-F687-4f45-9708-019B960494DF}">
-                  <a14:hiddenLine xmlns:a14="http://schemas.microsoft.com/office/drawing/2010/main" xmlns="" w="9525">
+                  <a14:hiddenLine xmlns="" xmlns:a14="http://schemas.microsoft.com/office/drawing/2010/main" w="9525">
                     <a:solidFill>
                       <a:srgbClr val="000000"/>
                     </a:solidFill>
@@ -9496,7 +9497,7 @@
               </a:ln>
               <a:extLst>
                 <a:ext uri="{91240B29-F687-4f45-9708-019B960494DF}">
-                  <a14:hiddenLine xmlns:a14="http://schemas.microsoft.com/office/drawing/2010/main" xmlns="" w="9525">
+                  <a14:hiddenLine xmlns="" xmlns:a14="http://schemas.microsoft.com/office/drawing/2010/main" w="9525">
                     <a:solidFill>
                       <a:srgbClr val="000000"/>
                     </a:solidFill>
@@ -9558,7 +9559,7 @@
               </a:ln>
               <a:extLst>
                 <a:ext uri="{91240B29-F687-4f45-9708-019B960494DF}">
-                  <a14:hiddenLine xmlns:a14="http://schemas.microsoft.com/office/drawing/2010/main" xmlns="" w="9525">
+                  <a14:hiddenLine xmlns="" xmlns:a14="http://schemas.microsoft.com/office/drawing/2010/main" w="9525">
                     <a:solidFill>
                       <a:srgbClr val="000000"/>
                     </a:solidFill>
@@ -9620,7 +9621,7 @@
               </a:ln>
               <a:extLst>
                 <a:ext uri="{91240B29-F687-4f45-9708-019B960494DF}">
-                  <a14:hiddenLine xmlns:a14="http://schemas.microsoft.com/office/drawing/2010/main" xmlns="" w="9525">
+                  <a14:hiddenLine xmlns="" xmlns:a14="http://schemas.microsoft.com/office/drawing/2010/main" w="9525">
                     <a:solidFill>
                       <a:srgbClr val="000000"/>
                     </a:solidFill>
@@ -9710,7 +9711,7 @@
               </a:ln>
               <a:extLst>
                 <a:ext uri="{91240B29-F687-4f45-9708-019B960494DF}">
-                  <a14:hiddenLine xmlns:a14="http://schemas.microsoft.com/office/drawing/2010/main" xmlns="" w="9525">
+                  <a14:hiddenLine xmlns="" xmlns:a14="http://schemas.microsoft.com/office/drawing/2010/main" w="9525">
                     <a:solidFill>
                       <a:srgbClr val="000000"/>
                     </a:solidFill>
@@ -9800,7 +9801,7 @@
               </a:ln>
               <a:extLst>
                 <a:ext uri="{91240B29-F687-4f45-9708-019B960494DF}">
-                  <a14:hiddenLine xmlns:a14="http://schemas.microsoft.com/office/drawing/2010/main" xmlns="" w="9525">
+                  <a14:hiddenLine xmlns="" xmlns:a14="http://schemas.microsoft.com/office/drawing/2010/main" w="9525">
                     <a:solidFill>
                       <a:srgbClr val="000000"/>
                     </a:solidFill>
@@ -9862,7 +9863,7 @@
               </a:ln>
               <a:extLst>
                 <a:ext uri="{91240B29-F687-4f45-9708-019B960494DF}">
-                  <a14:hiddenLine xmlns:a14="http://schemas.microsoft.com/office/drawing/2010/main" xmlns="" w="9525">
+                  <a14:hiddenLine xmlns="" xmlns:a14="http://schemas.microsoft.com/office/drawing/2010/main" w="9525">
                     <a:solidFill>
                       <a:srgbClr val="000000"/>
                     </a:solidFill>
@@ -9972,7 +9973,7 @@
               </a:ln>
               <a:extLst>
                 <a:ext uri="{91240B29-F687-4f45-9708-019B960494DF}">
-                  <a14:hiddenLine xmlns:a14="http://schemas.microsoft.com/office/drawing/2010/main" xmlns="" w="9525">
+                  <a14:hiddenLine xmlns="" xmlns:a14="http://schemas.microsoft.com/office/drawing/2010/main" w="9525">
                     <a:solidFill>
                       <a:srgbClr val="000000"/>
                     </a:solidFill>
@@ -10056,7 +10057,7 @@
               </a:ln>
               <a:extLst>
                 <a:ext uri="{91240B29-F687-4f45-9708-019B960494DF}">
-                  <a14:hiddenLine xmlns:a14="http://schemas.microsoft.com/office/drawing/2010/main" xmlns="" w="9525">
+                  <a14:hiddenLine xmlns="" xmlns:a14="http://schemas.microsoft.com/office/drawing/2010/main" w="9525">
                     <a:solidFill>
                       <a:srgbClr val="000000"/>
                     </a:solidFill>
@@ -10118,7 +10119,7 @@
               </a:ln>
               <a:extLst>
                 <a:ext uri="{91240B29-F687-4f45-9708-019B960494DF}">
-                  <a14:hiddenLine xmlns:a14="http://schemas.microsoft.com/office/drawing/2010/main" xmlns="" w="9525">
+                  <a14:hiddenLine xmlns="" xmlns:a14="http://schemas.microsoft.com/office/drawing/2010/main" w="9525">
                     <a:solidFill>
                       <a:srgbClr val="000000"/>
                     </a:solidFill>
@@ -10180,7 +10181,7 @@
               </a:ln>
               <a:extLst>
                 <a:ext uri="{91240B29-F687-4f45-9708-019B960494DF}">
-                  <a14:hiddenLine xmlns:a14="http://schemas.microsoft.com/office/drawing/2010/main" xmlns="" w="9525">
+                  <a14:hiddenLine xmlns="" xmlns:a14="http://schemas.microsoft.com/office/drawing/2010/main" w="9525">
                     <a:solidFill>
                       <a:srgbClr val="000000"/>
                     </a:solidFill>
@@ -10270,7 +10271,7 @@
               </a:ln>
               <a:extLst>
                 <a:ext uri="{91240B29-F687-4f45-9708-019B960494DF}">
-                  <a14:hiddenLine xmlns:a14="http://schemas.microsoft.com/office/drawing/2010/main" xmlns="" w="9525">
+                  <a14:hiddenLine xmlns="" xmlns:a14="http://schemas.microsoft.com/office/drawing/2010/main" w="9525">
                     <a:solidFill>
                       <a:srgbClr val="000000"/>
                     </a:solidFill>
@@ -10304,7 +10305,7 @@
               </a:ln>
               <a:extLst>
                 <a:ext uri="{91240B29-F687-4f45-9708-019B960494DF}">
-                  <a14:hiddenLine xmlns:a14="http://schemas.microsoft.com/office/drawing/2010/main" xmlns="" w="9525">
+                  <a14:hiddenLine xmlns="" xmlns:a14="http://schemas.microsoft.com/office/drawing/2010/main" w="9525">
                     <a:solidFill>
                       <a:srgbClr val="000000"/>
                     </a:solidFill>
@@ -10369,7 +10370,7 @@
               </a:ln>
               <a:extLst>
                 <a:ext uri="{91240B29-F687-4f45-9708-019B960494DF}">
-                  <a14:hiddenLine xmlns:a14="http://schemas.microsoft.com/office/drawing/2010/main" xmlns="" w="9525">
+                  <a14:hiddenLine xmlns="" xmlns:a14="http://schemas.microsoft.com/office/drawing/2010/main" w="9525">
                     <a:solidFill>
                       <a:srgbClr val="000000"/>
                     </a:solidFill>
@@ -10459,7 +10460,7 @@
               </a:ln>
               <a:extLst>
                 <a:ext uri="{91240B29-F687-4f45-9708-019B960494DF}">
-                  <a14:hiddenLine xmlns:a14="http://schemas.microsoft.com/office/drawing/2010/main" xmlns="" w="9525">
+                  <a14:hiddenLine xmlns="" xmlns:a14="http://schemas.microsoft.com/office/drawing/2010/main" w="9525">
                     <a:solidFill>
                       <a:srgbClr val="000000"/>
                     </a:solidFill>
@@ -10521,7 +10522,7 @@
               </a:ln>
               <a:extLst>
                 <a:ext uri="{91240B29-F687-4f45-9708-019B960494DF}">
-                  <a14:hiddenLine xmlns:a14="http://schemas.microsoft.com/office/drawing/2010/main" xmlns="" w="9525">
+                  <a14:hiddenLine xmlns="" xmlns:a14="http://schemas.microsoft.com/office/drawing/2010/main" w="9525">
                     <a:solidFill>
                       <a:srgbClr val="000000"/>
                     </a:solidFill>
@@ -10611,7 +10612,7 @@
               </a:ln>
               <a:extLst>
                 <a:ext uri="{91240B29-F687-4f45-9708-019B960494DF}">
-                  <a14:hiddenLine xmlns:a14="http://schemas.microsoft.com/office/drawing/2010/main" xmlns="" w="9525">
+                  <a14:hiddenLine xmlns="" xmlns:a14="http://schemas.microsoft.com/office/drawing/2010/main" w="9525">
                     <a:solidFill>
                       <a:srgbClr val="000000"/>
                     </a:solidFill>
@@ -10676,7 +10677,7 @@
               </a:ln>
               <a:extLst>
                 <a:ext uri="{91240B29-F687-4f45-9708-019B960494DF}">
-                  <a14:hiddenLine xmlns:a14="http://schemas.microsoft.com/office/drawing/2010/main" xmlns="" w="9525">
+                  <a14:hiddenLine xmlns="" xmlns:a14="http://schemas.microsoft.com/office/drawing/2010/main" w="9525">
                     <a:solidFill>
                       <a:srgbClr val="000000"/>
                     </a:solidFill>
@@ -10738,7 +10739,7 @@
               </a:ln>
               <a:extLst>
                 <a:ext uri="{91240B29-F687-4f45-9708-019B960494DF}">
-                  <a14:hiddenLine xmlns:a14="http://schemas.microsoft.com/office/drawing/2010/main" xmlns="" w="9525">
+                  <a14:hiddenLine xmlns="" xmlns:a14="http://schemas.microsoft.com/office/drawing/2010/main" w="9525">
                     <a:solidFill>
                       <a:srgbClr val="000000"/>
                     </a:solidFill>
@@ -10828,7 +10829,7 @@
               </a:ln>
               <a:extLst>
                 <a:ext uri="{91240B29-F687-4f45-9708-019B960494DF}">
-                  <a14:hiddenLine xmlns:a14="http://schemas.microsoft.com/office/drawing/2010/main" xmlns="" w="9525">
+                  <a14:hiddenLine xmlns="" xmlns:a14="http://schemas.microsoft.com/office/drawing/2010/main" w="9525">
                     <a:solidFill>
                       <a:srgbClr val="000000"/>
                     </a:solidFill>
@@ -10918,7 +10919,7 @@
               </a:ln>
               <a:extLst>
                 <a:ext uri="{91240B29-F687-4f45-9708-019B960494DF}">
-                  <a14:hiddenLine xmlns:a14="http://schemas.microsoft.com/office/drawing/2010/main" xmlns="" w="9525">
+                  <a14:hiddenLine xmlns="" xmlns:a14="http://schemas.microsoft.com/office/drawing/2010/main" w="9525">
                     <a:solidFill>
                       <a:srgbClr val="000000"/>
                     </a:solidFill>
@@ -10983,7 +10984,7 @@
               </a:ln>
               <a:extLst>
                 <a:ext uri="{91240B29-F687-4f45-9708-019B960494DF}">
-                  <a14:hiddenLine xmlns:a14="http://schemas.microsoft.com/office/drawing/2010/main" xmlns="" w="9525">
+                  <a14:hiddenLine xmlns="" xmlns:a14="http://schemas.microsoft.com/office/drawing/2010/main" w="9525">
                     <a:solidFill>
                       <a:srgbClr val="000000"/>
                     </a:solidFill>
@@ -11103,7 +11104,7 @@
               </a:ln>
               <a:extLst>
                 <a:ext uri="{91240B29-F687-4f45-9708-019B960494DF}">
-                  <a14:hiddenLine xmlns:a14="http://schemas.microsoft.com/office/drawing/2010/main" xmlns="" w="9525">
+                  <a14:hiddenLine xmlns="" xmlns:a14="http://schemas.microsoft.com/office/drawing/2010/main" w="9525">
                     <a:solidFill>
                       <a:srgbClr val="000000"/>
                     </a:solidFill>
@@ -11201,7 +11202,7 @@
               </a:ln>
               <a:extLst>
                 <a:ext uri="{91240B29-F687-4f45-9708-019B960494DF}">
-                  <a14:hiddenLine xmlns:a14="http://schemas.microsoft.com/office/drawing/2010/main" xmlns="" w="9525">
+                  <a14:hiddenLine xmlns="" xmlns:a14="http://schemas.microsoft.com/office/drawing/2010/main" w="9525">
                     <a:solidFill>
                       <a:srgbClr val="000000"/>
                     </a:solidFill>
@@ -11316,7 +11317,7 @@
               </a:ln>
               <a:extLst>
                 <a:ext uri="{91240B29-F687-4f45-9708-019B960494DF}">
-                  <a14:hiddenLine xmlns:a14="http://schemas.microsoft.com/office/drawing/2010/main" xmlns="" w="9525">
+                  <a14:hiddenLine xmlns="" xmlns:a14="http://schemas.microsoft.com/office/drawing/2010/main" w="9525">
                     <a:solidFill>
                       <a:srgbClr val="000000"/>
                     </a:solidFill>
@@ -11406,7 +11407,7 @@
               </a:ln>
               <a:extLst>
                 <a:ext uri="{91240B29-F687-4f45-9708-019B960494DF}">
-                  <a14:hiddenLine xmlns:a14="http://schemas.microsoft.com/office/drawing/2010/main" xmlns="" w="9525">
+                  <a14:hiddenLine xmlns="" xmlns:a14="http://schemas.microsoft.com/office/drawing/2010/main" w="9525">
                     <a:solidFill>
                       <a:srgbClr val="000000"/>
                     </a:solidFill>
@@ -11471,7 +11472,7 @@
               </a:ln>
               <a:extLst>
                 <a:ext uri="{91240B29-F687-4f45-9708-019B960494DF}">
-                  <a14:hiddenLine xmlns:a14="http://schemas.microsoft.com/office/drawing/2010/main" xmlns="" w="9525">
+                  <a14:hiddenLine xmlns="" xmlns:a14="http://schemas.microsoft.com/office/drawing/2010/main" w="9525">
                     <a:solidFill>
                       <a:srgbClr val="000000"/>
                     </a:solidFill>
@@ -11561,7 +11562,7 @@
               </a:ln>
               <a:extLst>
                 <a:ext uri="{91240B29-F687-4f45-9708-019B960494DF}">
-                  <a14:hiddenLine xmlns:a14="http://schemas.microsoft.com/office/drawing/2010/main" xmlns="" w="9525">
+                  <a14:hiddenLine xmlns="" xmlns:a14="http://schemas.microsoft.com/office/drawing/2010/main" w="9525">
                     <a:solidFill>
                       <a:srgbClr val="000000"/>
                     </a:solidFill>
@@ -11629,7 +11630,7 @@
               </a:ln>
               <a:extLst>
                 <a:ext uri="{91240B29-F687-4f45-9708-019B960494DF}">
-                  <a14:hiddenLine xmlns:a14="http://schemas.microsoft.com/office/drawing/2010/main" xmlns="" w="9525">
+                  <a14:hiddenLine xmlns="" xmlns:a14="http://schemas.microsoft.com/office/drawing/2010/main" w="9525">
                     <a:solidFill>
                       <a:srgbClr val="000000"/>
                     </a:solidFill>
@@ -11719,7 +11720,7 @@
               </a:ln>
               <a:extLst>
                 <a:ext uri="{91240B29-F687-4f45-9708-019B960494DF}">
-                  <a14:hiddenLine xmlns:a14="http://schemas.microsoft.com/office/drawing/2010/main" xmlns="" w="9525">
+                  <a14:hiddenLine xmlns="" xmlns:a14="http://schemas.microsoft.com/office/drawing/2010/main" w="9525">
                     <a:solidFill>
                       <a:srgbClr val="000000"/>
                     </a:solidFill>
@@ -11787,7 +11788,7 @@
               </a:ln>
               <a:extLst>
                 <a:ext uri="{91240B29-F687-4f45-9708-019B960494DF}">
-                  <a14:hiddenLine xmlns:a14="http://schemas.microsoft.com/office/drawing/2010/main" xmlns="" w="9525">
+                  <a14:hiddenLine xmlns="" xmlns:a14="http://schemas.microsoft.com/office/drawing/2010/main" w="9525">
                     <a:solidFill>
                       <a:srgbClr val="000000"/>
                     </a:solidFill>
@@ -11877,7 +11878,7 @@
               </a:ln>
               <a:extLst>
                 <a:ext uri="{91240B29-F687-4f45-9708-019B960494DF}">
-                  <a14:hiddenLine xmlns:a14="http://schemas.microsoft.com/office/drawing/2010/main" xmlns="" w="9525">
+                  <a14:hiddenLine xmlns="" xmlns:a14="http://schemas.microsoft.com/office/drawing/2010/main" w="9525">
                     <a:solidFill>
                       <a:srgbClr val="000000"/>
                     </a:solidFill>
@@ -11911,7 +11912,7 @@
               </a:ln>
               <a:extLst>
                 <a:ext uri="{91240B29-F687-4f45-9708-019B960494DF}">
-                  <a14:hiddenLine xmlns:a14="http://schemas.microsoft.com/office/drawing/2010/main" xmlns="" w="9525">
+                  <a14:hiddenLine xmlns="" xmlns:a14="http://schemas.microsoft.com/office/drawing/2010/main" w="9525">
                     <a:solidFill>
                       <a:srgbClr val="000000"/>
                     </a:solidFill>
@@ -12051,7 +12052,7 @@
           <a:p>
             <a:fld id="{367C922C-BE67-41A2-B295-B77D3DE255F6}" type="datetimeFigureOut">
               <a:rPr lang="en-US" smtClean="0"/>
-              <a:t>7/19/2017</a:t>
+              <a:t>20-Jul-17</a:t>
             </a:fld>
             <a:endParaRPr lang="en-US"/>
           </a:p>
@@ -12478,6 +12479,71 @@
       </p:grpSpPr>
       <p:sp>
         <p:nvSpPr>
+          <p:cNvPr id="2" name="Title 1">
+            <a:extLst>
+              <a:ext uri="{FF2B5EF4-FFF2-40B4-BE49-F238E27FC236}">
+                <a16:creationId xmlns:a16="http://schemas.microsoft.com/office/drawing/2014/main" id="{2708B3E3-53BD-4F10-8988-9E3B7B57EDDE}"/>
+              </a:ext>
+            </a:extLst>
+          </p:cNvPr>
+          <p:cNvSpPr>
+            <a:spLocks noGrp="1"/>
+          </p:cNvSpPr>
+          <p:nvPr>
+            <p:ph type="title"/>
+          </p:nvPr>
+        </p:nvSpPr>
+        <p:spPr>
+          <a:xfrm>
+            <a:off x="2632588" y="2405115"/>
+            <a:ext cx="9905998" cy="1478570"/>
+          </a:xfrm>
+        </p:spPr>
+        <p:txBody>
+          <a:bodyPr>
+            <a:normAutofit/>
+          </a:bodyPr>
+          <a:lstStyle/>
+          <a:p>
+            <a:r>
+              <a:rPr lang="en-US" sz="6600" dirty="0"/>
+              <a:t>MVC WITH Laravel</a:t>
+            </a:r>
+          </a:p>
+        </p:txBody>
+      </p:sp>
+    </p:spTree>
+    <p:extLst>
+      <p:ext uri="{BB962C8B-B14F-4D97-AF65-F5344CB8AC3E}">
+        <p14:creationId xmlns:p14="http://schemas.microsoft.com/office/powerpoint/2010/main" val="2898618901"/>
+      </p:ext>
+    </p:extLst>
+  </p:cSld>
+  <p:clrMapOvr>
+    <a:masterClrMapping/>
+  </p:clrMapOvr>
+</p:sld>
+</file>
+
+<file path=ppt/slides/slide2.xml><?xml version="1.0" encoding="utf-8"?>
+<p:sld xmlns:a="http://schemas.openxmlformats.org/drawingml/2006/main" xmlns:r="http://schemas.openxmlformats.org/officeDocument/2006/relationships" xmlns:p="http://schemas.openxmlformats.org/presentationml/2006/main">
+  <p:cSld>
+    <p:spTree>
+      <p:nvGrpSpPr>
+        <p:cNvPr id="1" name=""/>
+        <p:cNvGrpSpPr/>
+        <p:nvPr/>
+      </p:nvGrpSpPr>
+      <p:grpSpPr>
+        <a:xfrm>
+          <a:off x="0" y="0"/>
+          <a:ext cx="0" cy="0"/>
+          <a:chOff x="0" y="0"/>
+          <a:chExt cx="0" cy="0"/>
+        </a:xfrm>
+      </p:grpSpPr>
+      <p:sp>
+        <p:nvSpPr>
           <p:cNvPr id="4" name="TextBox 3">
             <a:extLst>
               <a:ext uri="{FF2B5EF4-FFF2-40B4-BE49-F238E27FC236}">
@@ -12575,7 +12641,368 @@
 </p:sld>
 </file>
 
-<file path=ppt/slides/slide2.xml><?xml version="1.0" encoding="utf-8"?>
+<file path=ppt/slides/slide3.xml><?xml version="1.0" encoding="utf-8"?>
+<p:sld xmlns:a="http://schemas.openxmlformats.org/drawingml/2006/main" xmlns:r="http://schemas.openxmlformats.org/officeDocument/2006/relationships" xmlns:p="http://schemas.openxmlformats.org/presentationml/2006/main">
+  <p:cSld>
+    <p:spTree>
+      <p:nvGrpSpPr>
+        <p:cNvPr id="1" name=""/>
+        <p:cNvGrpSpPr/>
+        <p:nvPr/>
+      </p:nvGrpSpPr>
+      <p:grpSpPr>
+        <a:xfrm>
+          <a:off x="0" y="0"/>
+          <a:ext cx="0" cy="0"/>
+          <a:chOff x="0" y="0"/>
+          <a:chExt cx="0" cy="0"/>
+        </a:xfrm>
+      </p:grpSpPr>
+      <p:sp>
+        <p:nvSpPr>
+          <p:cNvPr id="5" name="TextBox 4">
+            <a:extLst>
+              <a:ext uri="{FF2B5EF4-FFF2-40B4-BE49-F238E27FC236}">
+                <a16:creationId xmlns:a16="http://schemas.microsoft.com/office/drawing/2014/main" id="{6BFF68B9-51B1-42E8-8C0E-21FB445C3D10}"/>
+              </a:ext>
+            </a:extLst>
+          </p:cNvPr>
+          <p:cNvSpPr txBox="1"/>
+          <p:nvPr/>
+        </p:nvSpPr>
+        <p:spPr>
+          <a:xfrm>
+            <a:off x="3841529" y="1431335"/>
+            <a:ext cx="4408226" cy="707886"/>
+          </a:xfrm>
+          <a:prstGeom prst="rect">
+            <a:avLst/>
+          </a:prstGeom>
+          <a:noFill/>
+        </p:spPr>
+        <p:txBody>
+          <a:bodyPr wrap="square" rtlCol="0">
+            <a:spAutoFit/>
+          </a:bodyPr>
+          <a:lstStyle/>
+          <a:p>
+            <a:r>
+              <a:rPr lang="en-US" sz="4000" b="1" dirty="0">
+                <a:solidFill>
+                  <a:srgbClr val="002060"/>
+                </a:solidFill>
+                <a:latin typeface="Arial" panose="020B0604020202020204" pitchFamily="34" charset="0"/>
+                <a:cs typeface="Arial" panose="020B0604020202020204" pitchFamily="34" charset="0"/>
+              </a:rPr>
+              <a:t>What is Model ? </a:t>
+            </a:r>
+          </a:p>
+        </p:txBody>
+      </p:sp>
+      <p:sp>
+        <p:nvSpPr>
+          <p:cNvPr id="6" name="TextBox 5">
+            <a:extLst>
+              <a:ext uri="{FF2B5EF4-FFF2-40B4-BE49-F238E27FC236}">
+                <a16:creationId xmlns:a16="http://schemas.microsoft.com/office/drawing/2014/main" id="{FC182247-7D84-499A-9C16-AB06CD7E9692}"/>
+              </a:ext>
+            </a:extLst>
+          </p:cNvPr>
+          <p:cNvSpPr txBox="1"/>
+          <p:nvPr/>
+        </p:nvSpPr>
+        <p:spPr>
+          <a:xfrm>
+            <a:off x="915448" y="3300630"/>
+            <a:ext cx="10260387" cy="1323439"/>
+          </a:xfrm>
+          <a:prstGeom prst="rect">
+            <a:avLst/>
+          </a:prstGeom>
+          <a:solidFill>
+            <a:schemeClr val="accent5">
+              <a:lumMod val="50000"/>
+              <a:alpha val="50000"/>
+            </a:schemeClr>
+          </a:solidFill>
+        </p:spPr>
+        <p:txBody>
+          <a:bodyPr wrap="square" rtlCol="0">
+            <a:spAutoFit/>
+          </a:bodyPr>
+          <a:lstStyle/>
+          <a:p>
+            <a:r>
+              <a:rPr lang="en-US" sz="2000" b="1" dirty="0">
+                <a:latin typeface="Arial" panose="020B0604020202020204" pitchFamily="34" charset="0"/>
+                <a:cs typeface="Arial" panose="020B0604020202020204" pitchFamily="34" charset="0"/>
+              </a:rPr>
+              <a:t>The model is the central component of the pattern; which represents the underlying, logical structure of data in a software application and the high-level class associated with it. This object model does not contain any information about the user interface.</a:t>
+            </a:r>
+          </a:p>
+        </p:txBody>
+      </p:sp>
+    </p:spTree>
+    <p:extLst>
+      <p:ext uri="{BB962C8B-B14F-4D97-AF65-F5344CB8AC3E}">
+        <p14:creationId xmlns:p14="http://schemas.microsoft.com/office/powerpoint/2010/main" val="2763095150"/>
+      </p:ext>
+    </p:extLst>
+  </p:cSld>
+  <p:clrMapOvr>
+    <a:masterClrMapping/>
+  </p:clrMapOvr>
+</p:sld>
+</file>
+
+<file path=ppt/slides/slide4.xml><?xml version="1.0" encoding="utf-8"?>
+<p:sld xmlns:a="http://schemas.openxmlformats.org/drawingml/2006/main" xmlns:r="http://schemas.openxmlformats.org/officeDocument/2006/relationships" xmlns:p="http://schemas.openxmlformats.org/presentationml/2006/main">
+  <p:cSld>
+    <p:spTree>
+      <p:nvGrpSpPr>
+        <p:cNvPr id="1" name=""/>
+        <p:cNvGrpSpPr/>
+        <p:nvPr/>
+      </p:nvGrpSpPr>
+      <p:grpSpPr>
+        <a:xfrm>
+          <a:off x="0" y="0"/>
+          <a:ext cx="0" cy="0"/>
+          <a:chOff x="0" y="0"/>
+          <a:chExt cx="0" cy="0"/>
+        </a:xfrm>
+      </p:grpSpPr>
+      <p:sp>
+        <p:nvSpPr>
+          <p:cNvPr id="4" name="TextBox 3">
+            <a:extLst>
+              <a:ext uri="{FF2B5EF4-FFF2-40B4-BE49-F238E27FC236}">
+                <a16:creationId xmlns:a16="http://schemas.microsoft.com/office/drawing/2014/main" id="{071BC112-3880-4A3A-8493-AB124F52F52A}"/>
+              </a:ext>
+            </a:extLst>
+          </p:cNvPr>
+          <p:cNvSpPr txBox="1"/>
+          <p:nvPr/>
+        </p:nvSpPr>
+        <p:spPr>
+          <a:xfrm>
+            <a:off x="4100513" y="1471612"/>
+            <a:ext cx="5214937" cy="707886"/>
+          </a:xfrm>
+          <a:prstGeom prst="rect">
+            <a:avLst/>
+          </a:prstGeom>
+          <a:noFill/>
+        </p:spPr>
+        <p:txBody>
+          <a:bodyPr wrap="square" rtlCol="0">
+            <a:spAutoFit/>
+          </a:bodyPr>
+          <a:lstStyle/>
+          <a:p>
+            <a:r>
+              <a:rPr lang="en-US" sz="4000" b="1" dirty="0">
+                <a:solidFill>
+                  <a:srgbClr val="002060"/>
+                </a:solidFill>
+                <a:latin typeface="Arial" panose="020B0604020202020204" pitchFamily="34" charset="0"/>
+                <a:cs typeface="Arial" panose="020B0604020202020204" pitchFamily="34" charset="0"/>
+              </a:rPr>
+              <a:t>What is View ?</a:t>
+            </a:r>
+          </a:p>
+        </p:txBody>
+      </p:sp>
+      <p:sp>
+        <p:nvSpPr>
+          <p:cNvPr id="5" name="TextBox 4">
+            <a:extLst>
+              <a:ext uri="{FF2B5EF4-FFF2-40B4-BE49-F238E27FC236}">
+                <a16:creationId xmlns:a16="http://schemas.microsoft.com/office/drawing/2014/main" id="{C5682138-1EBA-43DE-8F03-FD52F97970A1}"/>
+              </a:ext>
+            </a:extLst>
+          </p:cNvPr>
+          <p:cNvSpPr txBox="1"/>
+          <p:nvPr/>
+        </p:nvSpPr>
+        <p:spPr>
+          <a:xfrm>
+            <a:off x="1471614" y="3343276"/>
+            <a:ext cx="9401174" cy="1015663"/>
+          </a:xfrm>
+          <a:prstGeom prst="rect">
+            <a:avLst/>
+          </a:prstGeom>
+          <a:solidFill>
+            <a:schemeClr val="accent5">
+              <a:lumMod val="50000"/>
+              <a:alpha val="50000"/>
+            </a:schemeClr>
+          </a:solidFill>
+        </p:spPr>
+        <p:txBody>
+          <a:bodyPr wrap="square" rtlCol="0">
+            <a:spAutoFit/>
+          </a:bodyPr>
+          <a:lstStyle/>
+          <a:p>
+            <a:r>
+              <a:rPr lang="en-US" sz="2000" b="1" dirty="0"/>
+              <a:t>A </a:t>
+            </a:r>
+            <a:r>
+              <a:rPr lang="en-US" sz="2000" b="1" i="1" dirty="0"/>
+              <a:t>view</a:t>
+            </a:r>
+            <a:r>
+              <a:rPr lang="en-US" sz="2000" b="1" dirty="0"/>
+              <a:t> can be any output representation of information, such as a chart or a diagram. Multiple views of the same information are possible, such as a bar chart for management and a tabular view for accountants.</a:t>
+            </a:r>
+          </a:p>
+        </p:txBody>
+      </p:sp>
+    </p:spTree>
+    <p:extLst>
+      <p:ext uri="{BB962C8B-B14F-4D97-AF65-F5344CB8AC3E}">
+        <p14:creationId xmlns:p14="http://schemas.microsoft.com/office/powerpoint/2010/main" val="3169926821"/>
+      </p:ext>
+    </p:extLst>
+  </p:cSld>
+  <p:clrMapOvr>
+    <a:masterClrMapping/>
+  </p:clrMapOvr>
+</p:sld>
+</file>
+
+<file path=ppt/slides/slide5.xml><?xml version="1.0" encoding="utf-8"?>
+<p:sld xmlns:a="http://schemas.openxmlformats.org/drawingml/2006/main" xmlns:r="http://schemas.openxmlformats.org/officeDocument/2006/relationships" xmlns:p="http://schemas.openxmlformats.org/presentationml/2006/main">
+  <p:cSld>
+    <p:spTree>
+      <p:nvGrpSpPr>
+        <p:cNvPr id="1" name=""/>
+        <p:cNvGrpSpPr/>
+        <p:nvPr/>
+      </p:nvGrpSpPr>
+      <p:grpSpPr>
+        <a:xfrm>
+          <a:off x="0" y="0"/>
+          <a:ext cx="0" cy="0"/>
+          <a:chOff x="0" y="0"/>
+          <a:chExt cx="0" cy="0"/>
+        </a:xfrm>
+      </p:grpSpPr>
+      <p:sp>
+        <p:nvSpPr>
+          <p:cNvPr id="4" name="TextBox 3">
+            <a:extLst>
+              <a:ext uri="{FF2B5EF4-FFF2-40B4-BE49-F238E27FC236}">
+                <a16:creationId xmlns:a16="http://schemas.microsoft.com/office/drawing/2014/main" id="{E0E469A5-4BA5-474F-97C7-B3DFCEE329D0}"/>
+              </a:ext>
+            </a:extLst>
+          </p:cNvPr>
+          <p:cNvSpPr txBox="1"/>
+          <p:nvPr/>
+        </p:nvSpPr>
+        <p:spPr>
+          <a:xfrm>
+            <a:off x="3418448" y="1885069"/>
+            <a:ext cx="5261318" cy="707886"/>
+          </a:xfrm>
+          <a:prstGeom prst="rect">
+            <a:avLst/>
+          </a:prstGeom>
+          <a:noFill/>
+        </p:spPr>
+        <p:txBody>
+          <a:bodyPr wrap="square" rtlCol="0">
+            <a:spAutoFit/>
+          </a:bodyPr>
+          <a:lstStyle/>
+          <a:p>
+            <a:r>
+              <a:rPr lang="en-US" sz="4000" b="1" dirty="0">
+                <a:solidFill>
+                  <a:srgbClr val="002060"/>
+                </a:solidFill>
+                <a:latin typeface="Arial" panose="020B0604020202020204" pitchFamily="34" charset="0"/>
+                <a:cs typeface="Arial" panose="020B0604020202020204" pitchFamily="34" charset="0"/>
+              </a:rPr>
+              <a:t>What is Controller ? </a:t>
+            </a:r>
+          </a:p>
+        </p:txBody>
+      </p:sp>
+      <p:sp>
+        <p:nvSpPr>
+          <p:cNvPr id="5" name="TextBox 4">
+            <a:extLst>
+              <a:ext uri="{FF2B5EF4-FFF2-40B4-BE49-F238E27FC236}">
+                <a16:creationId xmlns:a16="http://schemas.microsoft.com/office/drawing/2014/main" id="{35633616-5CAB-4318-AEC5-200EF360C75E}"/>
+              </a:ext>
+            </a:extLst>
+          </p:cNvPr>
+          <p:cNvSpPr txBox="1"/>
+          <p:nvPr/>
+        </p:nvSpPr>
+        <p:spPr>
+          <a:xfrm>
+            <a:off x="1322362" y="3488787"/>
+            <a:ext cx="9453489" cy="707886"/>
+          </a:xfrm>
+          <a:prstGeom prst="rect">
+            <a:avLst/>
+          </a:prstGeom>
+          <a:solidFill>
+            <a:schemeClr val="accent5">
+              <a:lumMod val="50000"/>
+              <a:alpha val="50000"/>
+            </a:schemeClr>
+          </a:solidFill>
+        </p:spPr>
+        <p:txBody>
+          <a:bodyPr wrap="square" rtlCol="0">
+            <a:spAutoFit/>
+          </a:bodyPr>
+          <a:lstStyle/>
+          <a:p>
+            <a:r>
+              <a:rPr lang="en-US" sz="2000" dirty="0">
+                <a:latin typeface="Arial" panose="020B0604020202020204" pitchFamily="34" charset="0"/>
+                <a:cs typeface="Arial" panose="020B0604020202020204" pitchFamily="34" charset="0"/>
+              </a:rPr>
+              <a:t>A </a:t>
+            </a:r>
+            <a:r>
+              <a:rPr lang="en-US" sz="2000" i="1" dirty="0">
+                <a:latin typeface="Arial" panose="020B0604020202020204" pitchFamily="34" charset="0"/>
+                <a:cs typeface="Arial" panose="020B0604020202020204" pitchFamily="34" charset="0"/>
+              </a:rPr>
+              <a:t>Controller</a:t>
+            </a:r>
+            <a:r>
+              <a:rPr lang="en-US" sz="2000" dirty="0">
+                <a:latin typeface="Arial" panose="020B0604020202020204" pitchFamily="34" charset="0"/>
+                <a:cs typeface="Arial" panose="020B0604020202020204" pitchFamily="34" charset="0"/>
+              </a:rPr>
+              <a:t> , which represents the classes connecting the model and the view, and is used to communicate between classes in the model and view.</a:t>
+            </a:r>
+          </a:p>
+        </p:txBody>
+      </p:sp>
+    </p:spTree>
+    <p:extLst>
+      <p:ext uri="{BB962C8B-B14F-4D97-AF65-F5344CB8AC3E}">
+        <p14:creationId xmlns:p14="http://schemas.microsoft.com/office/powerpoint/2010/main" val="1984640822"/>
+      </p:ext>
+    </p:extLst>
+  </p:cSld>
+  <p:clrMapOvr>
+    <a:masterClrMapping/>
+  </p:clrMapOvr>
+</p:sld>
+</file>
+
+<file path=ppt/slides/slide6.xml><?xml version="1.0" encoding="utf-8"?>
 <p:sld xmlns:a="http://schemas.openxmlformats.org/drawingml/2006/main" xmlns:r="http://schemas.openxmlformats.org/officeDocument/2006/relationships" xmlns:p="http://schemas.openxmlformats.org/presentationml/2006/main">
   <p:cSld>
     <p:bg>
@@ -13182,367 +13609,6 @@
     <p:extLst>
       <p:ext uri="{BB962C8B-B14F-4D97-AF65-F5344CB8AC3E}">
         <p14:creationId xmlns:p14="http://schemas.microsoft.com/office/powerpoint/2010/main" val="174592051"/>
-      </p:ext>
-    </p:extLst>
-  </p:cSld>
-  <p:clrMapOvr>
-    <a:masterClrMapping/>
-  </p:clrMapOvr>
-</p:sld>
-</file>
-
-<file path=ppt/slides/slide3.xml><?xml version="1.0" encoding="utf-8"?>
-<p:sld xmlns:a="http://schemas.openxmlformats.org/drawingml/2006/main" xmlns:r="http://schemas.openxmlformats.org/officeDocument/2006/relationships" xmlns:p="http://schemas.openxmlformats.org/presentationml/2006/main">
-  <p:cSld>
-    <p:spTree>
-      <p:nvGrpSpPr>
-        <p:cNvPr id="1" name=""/>
-        <p:cNvGrpSpPr/>
-        <p:nvPr/>
-      </p:nvGrpSpPr>
-      <p:grpSpPr>
-        <a:xfrm>
-          <a:off x="0" y="0"/>
-          <a:ext cx="0" cy="0"/>
-          <a:chOff x="0" y="0"/>
-          <a:chExt cx="0" cy="0"/>
-        </a:xfrm>
-      </p:grpSpPr>
-      <p:sp>
-        <p:nvSpPr>
-          <p:cNvPr id="5" name="TextBox 4">
-            <a:extLst>
-              <a:ext uri="{FF2B5EF4-FFF2-40B4-BE49-F238E27FC236}">
-                <a16:creationId xmlns:a16="http://schemas.microsoft.com/office/drawing/2014/main" id="{6BFF68B9-51B1-42E8-8C0E-21FB445C3D10}"/>
-              </a:ext>
-            </a:extLst>
-          </p:cNvPr>
-          <p:cNvSpPr txBox="1"/>
-          <p:nvPr/>
-        </p:nvSpPr>
-        <p:spPr>
-          <a:xfrm>
-            <a:off x="3841529" y="1431335"/>
-            <a:ext cx="4408226" cy="707886"/>
-          </a:xfrm>
-          <a:prstGeom prst="rect">
-            <a:avLst/>
-          </a:prstGeom>
-          <a:noFill/>
-        </p:spPr>
-        <p:txBody>
-          <a:bodyPr wrap="square" rtlCol="0">
-            <a:spAutoFit/>
-          </a:bodyPr>
-          <a:lstStyle/>
-          <a:p>
-            <a:r>
-              <a:rPr lang="en-US" sz="4000" b="1" dirty="0">
-                <a:solidFill>
-                  <a:srgbClr val="002060"/>
-                </a:solidFill>
-                <a:latin typeface="Arial" panose="020B0604020202020204" pitchFamily="34" charset="0"/>
-                <a:cs typeface="Arial" panose="020B0604020202020204" pitchFamily="34" charset="0"/>
-              </a:rPr>
-              <a:t>What is Model ? </a:t>
-            </a:r>
-          </a:p>
-        </p:txBody>
-      </p:sp>
-      <p:sp>
-        <p:nvSpPr>
-          <p:cNvPr id="6" name="TextBox 5">
-            <a:extLst>
-              <a:ext uri="{FF2B5EF4-FFF2-40B4-BE49-F238E27FC236}">
-                <a16:creationId xmlns:a16="http://schemas.microsoft.com/office/drawing/2014/main" id="{FC182247-7D84-499A-9C16-AB06CD7E9692}"/>
-              </a:ext>
-            </a:extLst>
-          </p:cNvPr>
-          <p:cNvSpPr txBox="1"/>
-          <p:nvPr/>
-        </p:nvSpPr>
-        <p:spPr>
-          <a:xfrm>
-            <a:off x="915448" y="3300630"/>
-            <a:ext cx="10260387" cy="1323439"/>
-          </a:xfrm>
-          <a:prstGeom prst="rect">
-            <a:avLst/>
-          </a:prstGeom>
-          <a:solidFill>
-            <a:schemeClr val="accent5">
-              <a:lumMod val="50000"/>
-              <a:alpha val="50000"/>
-            </a:schemeClr>
-          </a:solidFill>
-        </p:spPr>
-        <p:txBody>
-          <a:bodyPr wrap="square" rtlCol="0">
-            <a:spAutoFit/>
-          </a:bodyPr>
-          <a:lstStyle/>
-          <a:p>
-            <a:r>
-              <a:rPr lang="en-US" sz="2000" b="1" dirty="0">
-                <a:latin typeface="Arial" panose="020B0604020202020204" pitchFamily="34" charset="0"/>
-                <a:cs typeface="Arial" panose="020B0604020202020204" pitchFamily="34" charset="0"/>
-              </a:rPr>
-              <a:t>The model is the central component of the pattern; which represents the underlying, logical structure of data in a software application and the high-level class associated with it. This object model does not contain any information about the user interface.</a:t>
-            </a:r>
-          </a:p>
-        </p:txBody>
-      </p:sp>
-    </p:spTree>
-    <p:extLst>
-      <p:ext uri="{BB962C8B-B14F-4D97-AF65-F5344CB8AC3E}">
-        <p14:creationId xmlns:p14="http://schemas.microsoft.com/office/powerpoint/2010/main" val="2763095150"/>
-      </p:ext>
-    </p:extLst>
-  </p:cSld>
-  <p:clrMapOvr>
-    <a:masterClrMapping/>
-  </p:clrMapOvr>
-</p:sld>
-</file>
-
-<file path=ppt/slides/slide4.xml><?xml version="1.0" encoding="utf-8"?>
-<p:sld xmlns:a="http://schemas.openxmlformats.org/drawingml/2006/main" xmlns:r="http://schemas.openxmlformats.org/officeDocument/2006/relationships" xmlns:p="http://schemas.openxmlformats.org/presentationml/2006/main">
-  <p:cSld>
-    <p:spTree>
-      <p:nvGrpSpPr>
-        <p:cNvPr id="1" name=""/>
-        <p:cNvGrpSpPr/>
-        <p:nvPr/>
-      </p:nvGrpSpPr>
-      <p:grpSpPr>
-        <a:xfrm>
-          <a:off x="0" y="0"/>
-          <a:ext cx="0" cy="0"/>
-          <a:chOff x="0" y="0"/>
-          <a:chExt cx="0" cy="0"/>
-        </a:xfrm>
-      </p:grpSpPr>
-      <p:sp>
-        <p:nvSpPr>
-          <p:cNvPr id="4" name="TextBox 3">
-            <a:extLst>
-              <a:ext uri="{FF2B5EF4-FFF2-40B4-BE49-F238E27FC236}">
-                <a16:creationId xmlns:a16="http://schemas.microsoft.com/office/drawing/2014/main" id="{071BC112-3880-4A3A-8493-AB124F52F52A}"/>
-              </a:ext>
-            </a:extLst>
-          </p:cNvPr>
-          <p:cNvSpPr txBox="1"/>
-          <p:nvPr/>
-        </p:nvSpPr>
-        <p:spPr>
-          <a:xfrm>
-            <a:off x="4100513" y="1471612"/>
-            <a:ext cx="5214937" cy="707886"/>
-          </a:xfrm>
-          <a:prstGeom prst="rect">
-            <a:avLst/>
-          </a:prstGeom>
-          <a:noFill/>
-        </p:spPr>
-        <p:txBody>
-          <a:bodyPr wrap="square" rtlCol="0">
-            <a:spAutoFit/>
-          </a:bodyPr>
-          <a:lstStyle/>
-          <a:p>
-            <a:r>
-              <a:rPr lang="en-US" sz="4000" b="1" dirty="0">
-                <a:solidFill>
-                  <a:srgbClr val="002060"/>
-                </a:solidFill>
-                <a:latin typeface="Arial" panose="020B0604020202020204" pitchFamily="34" charset="0"/>
-                <a:cs typeface="Arial" panose="020B0604020202020204" pitchFamily="34" charset="0"/>
-              </a:rPr>
-              <a:t>What is View ?</a:t>
-            </a:r>
-          </a:p>
-        </p:txBody>
-      </p:sp>
-      <p:sp>
-        <p:nvSpPr>
-          <p:cNvPr id="5" name="TextBox 4">
-            <a:extLst>
-              <a:ext uri="{FF2B5EF4-FFF2-40B4-BE49-F238E27FC236}">
-                <a16:creationId xmlns:a16="http://schemas.microsoft.com/office/drawing/2014/main" id="{C5682138-1EBA-43DE-8F03-FD52F97970A1}"/>
-              </a:ext>
-            </a:extLst>
-          </p:cNvPr>
-          <p:cNvSpPr txBox="1"/>
-          <p:nvPr/>
-        </p:nvSpPr>
-        <p:spPr>
-          <a:xfrm>
-            <a:off x="1471614" y="3343276"/>
-            <a:ext cx="9401174" cy="1015663"/>
-          </a:xfrm>
-          <a:prstGeom prst="rect">
-            <a:avLst/>
-          </a:prstGeom>
-          <a:solidFill>
-            <a:schemeClr val="accent5">
-              <a:lumMod val="50000"/>
-              <a:alpha val="50000"/>
-            </a:schemeClr>
-          </a:solidFill>
-        </p:spPr>
-        <p:txBody>
-          <a:bodyPr wrap="square" rtlCol="0">
-            <a:spAutoFit/>
-          </a:bodyPr>
-          <a:lstStyle/>
-          <a:p>
-            <a:r>
-              <a:rPr lang="en-US" sz="2000" b="1" dirty="0"/>
-              <a:t>A </a:t>
-            </a:r>
-            <a:r>
-              <a:rPr lang="en-US" sz="2000" b="1" i="1" dirty="0"/>
-              <a:t>view</a:t>
-            </a:r>
-            <a:r>
-              <a:rPr lang="en-US" sz="2000" b="1" dirty="0"/>
-              <a:t> can be any output representation of information, such as a chart or a diagram. Multiple views of the same information are possible, such as a bar chart for management and a tabular view for accountants.</a:t>
-            </a:r>
-          </a:p>
-        </p:txBody>
-      </p:sp>
-    </p:spTree>
-    <p:extLst>
-      <p:ext uri="{BB962C8B-B14F-4D97-AF65-F5344CB8AC3E}">
-        <p14:creationId xmlns:p14="http://schemas.microsoft.com/office/powerpoint/2010/main" val="3169926821"/>
-      </p:ext>
-    </p:extLst>
-  </p:cSld>
-  <p:clrMapOvr>
-    <a:masterClrMapping/>
-  </p:clrMapOvr>
-</p:sld>
-</file>
-
-<file path=ppt/slides/slide5.xml><?xml version="1.0" encoding="utf-8"?>
-<p:sld xmlns:a="http://schemas.openxmlformats.org/drawingml/2006/main" xmlns:r="http://schemas.openxmlformats.org/officeDocument/2006/relationships" xmlns:p="http://schemas.openxmlformats.org/presentationml/2006/main">
-  <p:cSld>
-    <p:spTree>
-      <p:nvGrpSpPr>
-        <p:cNvPr id="1" name=""/>
-        <p:cNvGrpSpPr/>
-        <p:nvPr/>
-      </p:nvGrpSpPr>
-      <p:grpSpPr>
-        <a:xfrm>
-          <a:off x="0" y="0"/>
-          <a:ext cx="0" cy="0"/>
-          <a:chOff x="0" y="0"/>
-          <a:chExt cx="0" cy="0"/>
-        </a:xfrm>
-      </p:grpSpPr>
-      <p:sp>
-        <p:nvSpPr>
-          <p:cNvPr id="4" name="TextBox 3">
-            <a:extLst>
-              <a:ext uri="{FF2B5EF4-FFF2-40B4-BE49-F238E27FC236}">
-                <a16:creationId xmlns:a16="http://schemas.microsoft.com/office/drawing/2014/main" id="{E0E469A5-4BA5-474F-97C7-B3DFCEE329D0}"/>
-              </a:ext>
-            </a:extLst>
-          </p:cNvPr>
-          <p:cNvSpPr txBox="1"/>
-          <p:nvPr/>
-        </p:nvSpPr>
-        <p:spPr>
-          <a:xfrm>
-            <a:off x="3418448" y="1885069"/>
-            <a:ext cx="5261318" cy="707886"/>
-          </a:xfrm>
-          <a:prstGeom prst="rect">
-            <a:avLst/>
-          </a:prstGeom>
-          <a:noFill/>
-        </p:spPr>
-        <p:txBody>
-          <a:bodyPr wrap="square" rtlCol="0">
-            <a:spAutoFit/>
-          </a:bodyPr>
-          <a:lstStyle/>
-          <a:p>
-            <a:r>
-              <a:rPr lang="en-US" sz="4000" b="1" dirty="0">
-                <a:solidFill>
-                  <a:srgbClr val="002060"/>
-                </a:solidFill>
-                <a:latin typeface="Arial" panose="020B0604020202020204" pitchFamily="34" charset="0"/>
-                <a:cs typeface="Arial" panose="020B0604020202020204" pitchFamily="34" charset="0"/>
-              </a:rPr>
-              <a:t>What is Controller ? </a:t>
-            </a:r>
-          </a:p>
-        </p:txBody>
-      </p:sp>
-      <p:sp>
-        <p:nvSpPr>
-          <p:cNvPr id="5" name="TextBox 4">
-            <a:extLst>
-              <a:ext uri="{FF2B5EF4-FFF2-40B4-BE49-F238E27FC236}">
-                <a16:creationId xmlns:a16="http://schemas.microsoft.com/office/drawing/2014/main" id="{35633616-5CAB-4318-AEC5-200EF360C75E}"/>
-              </a:ext>
-            </a:extLst>
-          </p:cNvPr>
-          <p:cNvSpPr txBox="1"/>
-          <p:nvPr/>
-        </p:nvSpPr>
-        <p:spPr>
-          <a:xfrm>
-            <a:off x="1322362" y="3488787"/>
-            <a:ext cx="9453489" cy="707886"/>
-          </a:xfrm>
-          <a:prstGeom prst="rect">
-            <a:avLst/>
-          </a:prstGeom>
-          <a:solidFill>
-            <a:schemeClr val="accent5">
-              <a:lumMod val="50000"/>
-              <a:alpha val="50000"/>
-            </a:schemeClr>
-          </a:solidFill>
-        </p:spPr>
-        <p:txBody>
-          <a:bodyPr wrap="square" rtlCol="0">
-            <a:spAutoFit/>
-          </a:bodyPr>
-          <a:lstStyle/>
-          <a:p>
-            <a:r>
-              <a:rPr lang="en-US" sz="2000" dirty="0">
-                <a:latin typeface="Arial" panose="020B0604020202020204" pitchFamily="34" charset="0"/>
-                <a:cs typeface="Arial" panose="020B0604020202020204" pitchFamily="34" charset="0"/>
-              </a:rPr>
-              <a:t>A </a:t>
-            </a:r>
-            <a:r>
-              <a:rPr lang="en-US" sz="2000" i="1" dirty="0">
-                <a:latin typeface="Arial" panose="020B0604020202020204" pitchFamily="34" charset="0"/>
-                <a:cs typeface="Arial" panose="020B0604020202020204" pitchFamily="34" charset="0"/>
-              </a:rPr>
-              <a:t>Controller</a:t>
-            </a:r>
-            <a:r>
-              <a:rPr lang="en-US" sz="2000" dirty="0">
-                <a:latin typeface="Arial" panose="020B0604020202020204" pitchFamily="34" charset="0"/>
-                <a:cs typeface="Arial" panose="020B0604020202020204" pitchFamily="34" charset="0"/>
-              </a:rPr>
-              <a:t> , which represents the classes connecting the model and the view, and is used to communicate between classes in the model and view.</a:t>
-            </a:r>
-          </a:p>
-        </p:txBody>
-      </p:sp>
-    </p:spTree>
-    <p:extLst>
-      <p:ext uri="{BB962C8B-B14F-4D97-AF65-F5344CB8AC3E}">
-        <p14:creationId xmlns:p14="http://schemas.microsoft.com/office/powerpoint/2010/main" val="1984640822"/>
       </p:ext>
     </p:extLst>
   </p:cSld>

</xml_diff>